<commit_message>
Updating the documentation and loading the initial cut of the instruction for installing OAServer and OANode on the RPi
</commit_message>
<xml_diff>
--- a/Software_Release_Schedule.pptx
+++ b/Software_Release_Schedule.pptx
@@ -291,7 +291,7 @@
           <a:p>
             <a:fld id="{D28CB34D-CBFC-441B-9881-C4F7C8652995}" type="datetimeFigureOut">
               <a:rPr lang="en-US" smtClean="0"/>
-              <a:t>11/27/2012</a:t>
+              <a:t>2/5/2013</a:t>
             </a:fld>
             <a:endParaRPr lang="en-US"/>
           </a:p>
@@ -461,7 +461,7 @@
           <a:p>
             <a:fld id="{D28CB34D-CBFC-441B-9881-C4F7C8652995}" type="datetimeFigureOut">
               <a:rPr lang="en-US" smtClean="0"/>
-              <a:t>11/27/2012</a:t>
+              <a:t>2/5/2013</a:t>
             </a:fld>
             <a:endParaRPr lang="en-US"/>
           </a:p>
@@ -641,7 +641,7 @@
           <a:p>
             <a:fld id="{D28CB34D-CBFC-441B-9881-C4F7C8652995}" type="datetimeFigureOut">
               <a:rPr lang="en-US" smtClean="0"/>
-              <a:t>11/27/2012</a:t>
+              <a:t>2/5/2013</a:t>
             </a:fld>
             <a:endParaRPr lang="en-US"/>
           </a:p>
@@ -811,7 +811,7 @@
           <a:p>
             <a:fld id="{D28CB34D-CBFC-441B-9881-C4F7C8652995}" type="datetimeFigureOut">
               <a:rPr lang="en-US" smtClean="0"/>
-              <a:t>11/27/2012</a:t>
+              <a:t>2/5/2013</a:t>
             </a:fld>
             <a:endParaRPr lang="en-US"/>
           </a:p>
@@ -1057,7 +1057,7 @@
           <a:p>
             <a:fld id="{D28CB34D-CBFC-441B-9881-C4F7C8652995}" type="datetimeFigureOut">
               <a:rPr lang="en-US" smtClean="0"/>
-              <a:t>11/27/2012</a:t>
+              <a:t>2/5/2013</a:t>
             </a:fld>
             <a:endParaRPr lang="en-US"/>
           </a:p>
@@ -1345,7 +1345,7 @@
           <a:p>
             <a:fld id="{D28CB34D-CBFC-441B-9881-C4F7C8652995}" type="datetimeFigureOut">
               <a:rPr lang="en-US" smtClean="0"/>
-              <a:t>11/27/2012</a:t>
+              <a:t>2/5/2013</a:t>
             </a:fld>
             <a:endParaRPr lang="en-US"/>
           </a:p>
@@ -1767,7 +1767,7 @@
           <a:p>
             <a:fld id="{D28CB34D-CBFC-441B-9881-C4F7C8652995}" type="datetimeFigureOut">
               <a:rPr lang="en-US" smtClean="0"/>
-              <a:t>11/27/2012</a:t>
+              <a:t>2/5/2013</a:t>
             </a:fld>
             <a:endParaRPr lang="en-US"/>
           </a:p>
@@ -1885,7 +1885,7 @@
           <a:p>
             <a:fld id="{D28CB34D-CBFC-441B-9881-C4F7C8652995}" type="datetimeFigureOut">
               <a:rPr lang="en-US" smtClean="0"/>
-              <a:t>11/27/2012</a:t>
+              <a:t>2/5/2013</a:t>
             </a:fld>
             <a:endParaRPr lang="en-US"/>
           </a:p>
@@ -1980,7 +1980,7 @@
           <a:p>
             <a:fld id="{D28CB34D-CBFC-441B-9881-C4F7C8652995}" type="datetimeFigureOut">
               <a:rPr lang="en-US" smtClean="0"/>
-              <a:t>11/27/2012</a:t>
+              <a:t>2/5/2013</a:t>
             </a:fld>
             <a:endParaRPr lang="en-US"/>
           </a:p>
@@ -2257,7 +2257,7 @@
           <a:p>
             <a:fld id="{D28CB34D-CBFC-441B-9881-C4F7C8652995}" type="datetimeFigureOut">
               <a:rPr lang="en-US" smtClean="0"/>
-              <a:t>11/27/2012</a:t>
+              <a:t>2/5/2013</a:t>
             </a:fld>
             <a:endParaRPr lang="en-US"/>
           </a:p>
@@ -2510,7 +2510,7 @@
           <a:p>
             <a:fld id="{D28CB34D-CBFC-441B-9881-C4F7C8652995}" type="datetimeFigureOut">
               <a:rPr lang="en-US" smtClean="0"/>
-              <a:t>11/27/2012</a:t>
+              <a:t>2/5/2013</a:t>
             </a:fld>
             <a:endParaRPr lang="en-US"/>
           </a:p>
@@ -2723,7 +2723,7 @@
           <a:p>
             <a:fld id="{D28CB34D-CBFC-441B-9881-C4F7C8652995}" type="datetimeFigureOut">
               <a:rPr lang="en-US" smtClean="0"/>
-              <a:t>11/27/2012</a:t>
+              <a:t>2/5/2013</a:t>
             </a:fld>
             <a:endParaRPr lang="en-US"/>
           </a:p>
@@ -3129,7 +3129,6 @@
               <a:rPr lang="en-US" sz="3000" dirty="0" smtClean="0"/>
               <a:t> </a:t>
             </a:r>
-            <a:endParaRPr lang="en-US" sz="3000" dirty="0" smtClean="0"/>
           </a:p>
           <a:p>
             <a:pPr algn="ctr"/>
@@ -3139,11 +3138,7 @@
             </a:r>
             <a:r>
               <a:rPr lang="en-US" dirty="0" smtClean="0"/>
-              <a:t>otional </a:t>
-            </a:r>
-            <a:r>
-              <a:rPr lang="en-US" dirty="0" smtClean="0"/>
-              <a:t>software release schedule</a:t>
+              <a:t>otional software release schedule</a:t>
             </a:r>
             <a:endParaRPr lang="en-US" dirty="0"/>
           </a:p>
@@ -3188,6 +3183,277 @@
       </p:grpSpPr>
       <p:grpSp>
         <p:nvGrpSpPr>
+          <p:cNvPr id="5" name="Group 4"/>
+          <p:cNvGrpSpPr/>
+          <p:nvPr/>
+        </p:nvGrpSpPr>
+        <p:grpSpPr>
+          <a:xfrm>
+            <a:off x="3276600" y="777227"/>
+            <a:ext cx="3124200" cy="3982337"/>
+            <a:chOff x="3276600" y="777227"/>
+            <a:chExt cx="3124200" cy="3982337"/>
+          </a:xfrm>
+        </p:grpSpPr>
+        <p:sp>
+          <p:nvSpPr>
+            <p:cNvPr id="78" name="Rounded Rectangle 77"/>
+            <p:cNvSpPr/>
+            <p:nvPr/>
+          </p:nvSpPr>
+          <p:spPr>
+            <a:xfrm>
+              <a:off x="3276600" y="777227"/>
+              <a:ext cx="3124200" cy="3982337"/>
+            </a:xfrm>
+            <a:prstGeom prst="roundRect">
+              <a:avLst/>
+            </a:prstGeom>
+            <a:solidFill>
+              <a:schemeClr val="accent3">
+                <a:lumMod val="60000"/>
+                <a:lumOff val="40000"/>
+              </a:schemeClr>
+            </a:solidFill>
+          </p:spPr>
+          <p:style>
+            <a:lnRef idx="2">
+              <a:schemeClr val="accent1">
+                <a:shade val="50000"/>
+              </a:schemeClr>
+            </a:lnRef>
+            <a:fillRef idx="1">
+              <a:schemeClr val="accent1"/>
+            </a:fillRef>
+            <a:effectRef idx="0">
+              <a:schemeClr val="accent1"/>
+            </a:effectRef>
+            <a:fontRef idx="minor">
+              <a:schemeClr val="lt1"/>
+            </a:fontRef>
+          </p:style>
+          <p:txBody>
+            <a:bodyPr rtlCol="0" anchor="ctr"/>
+            <a:lstStyle/>
+            <a:p>
+              <a:pPr algn="ctr"/>
+              <a:endParaRPr lang="en-US" dirty="0"/>
+            </a:p>
+            <a:p>
+              <a:pPr algn="ctr"/>
+              <a:endParaRPr lang="en-US" dirty="0" smtClean="0"/>
+            </a:p>
+            <a:p>
+              <a:pPr algn="ctr"/>
+              <a:endParaRPr lang="en-US" dirty="0"/>
+            </a:p>
+            <a:p>
+              <a:pPr algn="ctr"/>
+              <a:endParaRPr lang="en-US" dirty="0" smtClean="0"/>
+            </a:p>
+            <a:p>
+              <a:pPr algn="ctr"/>
+              <a:endParaRPr lang="en-US" dirty="0" smtClean="0"/>
+            </a:p>
+            <a:p>
+              <a:pPr algn="ctr"/>
+              <a:endParaRPr lang="en-US" dirty="0"/>
+            </a:p>
+            <a:p>
+              <a:pPr algn="ctr"/>
+              <a:endParaRPr lang="en-US" dirty="0" smtClean="0"/>
+            </a:p>
+            <a:p>
+              <a:pPr algn="ctr"/>
+              <a:endParaRPr lang="en-US" dirty="0"/>
+            </a:p>
+            <a:p>
+              <a:pPr algn="ctr"/>
+              <a:endParaRPr lang="en-US" dirty="0" smtClean="0"/>
+            </a:p>
+            <a:p>
+              <a:pPr algn="ctr"/>
+              <a:endParaRPr lang="en-US" dirty="0" smtClean="0"/>
+            </a:p>
+            <a:p>
+              <a:pPr algn="ctr"/>
+              <a:endParaRPr lang="en-US" dirty="0"/>
+            </a:p>
+            <a:p>
+              <a:pPr algn="ctr"/>
+              <a:r>
+                <a:rPr lang="en-US" dirty="0" smtClean="0"/>
+                <a:t>Local</a:t>
+              </a:r>
+            </a:p>
+            <a:p>
+              <a:pPr algn="ctr"/>
+              <a:r>
+                <a:rPr lang="en-US" dirty="0" smtClean="0"/>
+                <a:t>Server Computer</a:t>
+              </a:r>
+            </a:p>
+          </p:txBody>
+        </p:sp>
+        <p:sp>
+          <p:nvSpPr>
+            <p:cNvPr id="3" name="Can 2"/>
+            <p:cNvSpPr/>
+            <p:nvPr/>
+          </p:nvSpPr>
+          <p:spPr>
+            <a:xfrm>
+              <a:off x="4091317" y="2806995"/>
+              <a:ext cx="1491217" cy="1150531"/>
+            </a:xfrm>
+            <a:prstGeom prst="can">
+              <a:avLst/>
+            </a:prstGeom>
+          </p:spPr>
+          <p:style>
+            <a:lnRef idx="2">
+              <a:schemeClr val="accent1">
+                <a:shade val="50000"/>
+              </a:schemeClr>
+            </a:lnRef>
+            <a:fillRef idx="1">
+              <a:schemeClr val="accent1"/>
+            </a:fillRef>
+            <a:effectRef idx="0">
+              <a:schemeClr val="accent1"/>
+            </a:effectRef>
+            <a:fontRef idx="minor">
+              <a:schemeClr val="lt1"/>
+            </a:fontRef>
+          </p:style>
+          <p:txBody>
+            <a:bodyPr rtlCol="0" anchor="ctr"/>
+            <a:lstStyle/>
+            <a:p>
+              <a:pPr algn="ctr"/>
+              <a:r>
+                <a:rPr lang="en-US" dirty="0" smtClean="0"/>
+                <a:t>Database</a:t>
+              </a:r>
+            </a:p>
+            <a:p>
+              <a:pPr algn="ctr"/>
+              <a:r>
+                <a:rPr lang="en-US" dirty="0" smtClean="0"/>
+                <a:t>(MySQL)</a:t>
+              </a:r>
+              <a:endParaRPr lang="en-US" dirty="0"/>
+            </a:p>
+          </p:txBody>
+        </p:sp>
+        <p:cxnSp>
+          <p:nvCxnSpPr>
+            <p:cNvPr id="23" name="Straight Arrow Connector 22"/>
+            <p:cNvCxnSpPr>
+              <a:stCxn id="27" idx="2"/>
+            </p:cNvCxnSpPr>
+            <p:nvPr/>
+          </p:nvCxnSpPr>
+          <p:spPr>
+            <a:xfrm flipH="1">
+              <a:off x="4836925" y="2244377"/>
+              <a:ext cx="2" cy="692755"/>
+            </a:xfrm>
+            <a:prstGeom prst="straightConnector1">
+              <a:avLst/>
+            </a:prstGeom>
+            <a:ln w="25400">
+              <a:solidFill>
+                <a:schemeClr val="accent2">
+                  <a:lumMod val="75000"/>
+                </a:schemeClr>
+              </a:solidFill>
+              <a:prstDash val="sysDash"/>
+              <a:headEnd type="arrow"/>
+              <a:tailEnd type="arrow"/>
+            </a:ln>
+          </p:spPr>
+          <p:style>
+            <a:lnRef idx="1">
+              <a:schemeClr val="accent1"/>
+            </a:lnRef>
+            <a:fillRef idx="0">
+              <a:schemeClr val="accent1"/>
+            </a:fillRef>
+            <a:effectRef idx="0">
+              <a:schemeClr val="accent1"/>
+            </a:effectRef>
+            <a:fontRef idx="minor">
+              <a:schemeClr val="tx1"/>
+            </a:fontRef>
+          </p:style>
+        </p:cxnSp>
+      </p:grpSp>
+      <p:sp>
+        <p:nvSpPr>
+          <p:cNvPr id="27" name="Rounded Rectangle 26"/>
+          <p:cNvSpPr/>
+          <p:nvPr/>
+        </p:nvSpPr>
+        <p:spPr>
+          <a:xfrm>
+            <a:off x="3693927" y="1026263"/>
+            <a:ext cx="2285999" cy="1218114"/>
+          </a:xfrm>
+          <a:prstGeom prst="roundRect">
+            <a:avLst/>
+          </a:prstGeom>
+        </p:spPr>
+        <p:style>
+          <a:lnRef idx="2">
+            <a:schemeClr val="accent1">
+              <a:shade val="50000"/>
+            </a:schemeClr>
+          </a:lnRef>
+          <a:fillRef idx="1">
+            <a:schemeClr val="accent1"/>
+          </a:fillRef>
+          <a:effectRef idx="0">
+            <a:schemeClr val="accent1"/>
+          </a:effectRef>
+          <a:fontRef idx="minor">
+            <a:schemeClr val="lt1"/>
+          </a:fontRef>
+        </p:style>
+        <p:txBody>
+          <a:bodyPr rtlCol="0" anchor="ctr"/>
+          <a:lstStyle/>
+          <a:p>
+            <a:pPr algn="ctr"/>
+            <a:r>
+              <a:rPr lang="en-US" dirty="0" smtClean="0"/>
+              <a:t>OAServer (REST API)</a:t>
+            </a:r>
+            <a:endParaRPr lang="en-US" dirty="0" smtClean="0"/>
+          </a:p>
+          <a:p>
+            <a:pPr algn="ctr"/>
+            <a:r>
+              <a:rPr lang="en-US" sz="1200" dirty="0" smtClean="0"/>
+              <a:t>Device: RPi / Linux Computer</a:t>
+            </a:r>
+          </a:p>
+          <a:p>
+            <a:pPr algn="ctr"/>
+            <a:r>
+              <a:rPr lang="en-US" sz="1200" dirty="0" smtClean="0"/>
+              <a:t>Language: </a:t>
+            </a:r>
+            <a:r>
+              <a:rPr lang="en-US" sz="1200" dirty="0" smtClean="0"/>
+              <a:t>Php</a:t>
+            </a:r>
+            <a:endParaRPr lang="en-US" sz="1200" dirty="0" smtClean="0"/>
+          </a:p>
+        </p:txBody>
+      </p:sp>
+      <p:grpSp>
+        <p:nvGrpSpPr>
           <p:cNvPr id="97" name="Group 96"/>
           <p:cNvGrpSpPr/>
           <p:nvPr/>
@@ -3322,271 +3588,6 @@
             </a:p>
           </p:txBody>
         </p:sp>
-      </p:grpSp>
-      <p:grpSp>
-        <p:nvGrpSpPr>
-          <p:cNvPr id="5" name="Group 4"/>
-          <p:cNvGrpSpPr/>
-          <p:nvPr/>
-        </p:nvGrpSpPr>
-        <p:grpSpPr>
-          <a:xfrm>
-            <a:off x="3276600" y="777227"/>
-            <a:ext cx="3124200" cy="3982337"/>
-            <a:chOff x="3276600" y="777227"/>
-            <a:chExt cx="3124200" cy="3982337"/>
-          </a:xfrm>
-        </p:grpSpPr>
-        <p:sp>
-          <p:nvSpPr>
-            <p:cNvPr id="78" name="Rounded Rectangle 77"/>
-            <p:cNvSpPr/>
-            <p:nvPr/>
-          </p:nvSpPr>
-          <p:spPr>
-            <a:xfrm>
-              <a:off x="3276600" y="777227"/>
-              <a:ext cx="3124200" cy="3982337"/>
-            </a:xfrm>
-            <a:prstGeom prst="roundRect">
-              <a:avLst/>
-            </a:prstGeom>
-            <a:solidFill>
-              <a:schemeClr val="accent3">
-                <a:lumMod val="60000"/>
-                <a:lumOff val="40000"/>
-              </a:schemeClr>
-            </a:solidFill>
-          </p:spPr>
-          <p:style>
-            <a:lnRef idx="2">
-              <a:schemeClr val="accent1">
-                <a:shade val="50000"/>
-              </a:schemeClr>
-            </a:lnRef>
-            <a:fillRef idx="1">
-              <a:schemeClr val="accent1"/>
-            </a:fillRef>
-            <a:effectRef idx="0">
-              <a:schemeClr val="accent1"/>
-            </a:effectRef>
-            <a:fontRef idx="minor">
-              <a:schemeClr val="lt1"/>
-            </a:fontRef>
-          </p:style>
-          <p:txBody>
-            <a:bodyPr rtlCol="0" anchor="ctr"/>
-            <a:lstStyle/>
-            <a:p>
-              <a:pPr algn="ctr"/>
-              <a:endParaRPr lang="en-US" dirty="0"/>
-            </a:p>
-            <a:p>
-              <a:pPr algn="ctr"/>
-              <a:endParaRPr lang="en-US" dirty="0" smtClean="0"/>
-            </a:p>
-            <a:p>
-              <a:pPr algn="ctr"/>
-              <a:endParaRPr lang="en-US" dirty="0"/>
-            </a:p>
-            <a:p>
-              <a:pPr algn="ctr"/>
-              <a:endParaRPr lang="en-US" dirty="0" smtClean="0"/>
-            </a:p>
-            <a:p>
-              <a:pPr algn="ctr"/>
-              <a:endParaRPr lang="en-US" dirty="0" smtClean="0"/>
-            </a:p>
-            <a:p>
-              <a:pPr algn="ctr"/>
-              <a:endParaRPr lang="en-US" dirty="0"/>
-            </a:p>
-            <a:p>
-              <a:pPr algn="ctr"/>
-              <a:endParaRPr lang="en-US" dirty="0" smtClean="0"/>
-            </a:p>
-            <a:p>
-              <a:pPr algn="ctr"/>
-              <a:endParaRPr lang="en-US" dirty="0"/>
-            </a:p>
-            <a:p>
-              <a:pPr algn="ctr"/>
-              <a:endParaRPr lang="en-US" dirty="0" smtClean="0"/>
-            </a:p>
-            <a:p>
-              <a:pPr algn="ctr"/>
-              <a:endParaRPr lang="en-US" dirty="0" smtClean="0"/>
-            </a:p>
-            <a:p>
-              <a:pPr algn="ctr"/>
-              <a:endParaRPr lang="en-US" dirty="0"/>
-            </a:p>
-            <a:p>
-              <a:pPr algn="ctr"/>
-              <a:r>
-                <a:rPr lang="en-US" dirty="0" smtClean="0"/>
-                <a:t>Local</a:t>
-              </a:r>
-            </a:p>
-            <a:p>
-              <a:pPr algn="ctr"/>
-              <a:r>
-                <a:rPr lang="en-US" dirty="0" smtClean="0"/>
-                <a:t>Server Computer</a:t>
-              </a:r>
-            </a:p>
-          </p:txBody>
-        </p:sp>
-        <p:sp>
-          <p:nvSpPr>
-            <p:cNvPr id="9" name="Rounded Rectangle 8"/>
-            <p:cNvSpPr/>
-            <p:nvPr/>
-          </p:nvSpPr>
-          <p:spPr>
-            <a:xfrm>
-              <a:off x="3770128" y="1006608"/>
-              <a:ext cx="2133600" cy="873252"/>
-            </a:xfrm>
-            <a:prstGeom prst="roundRect">
-              <a:avLst/>
-            </a:prstGeom>
-          </p:spPr>
-          <p:style>
-            <a:lnRef idx="2">
-              <a:schemeClr val="accent1">
-                <a:shade val="50000"/>
-              </a:schemeClr>
-            </a:lnRef>
-            <a:fillRef idx="1">
-              <a:schemeClr val="accent1"/>
-            </a:fillRef>
-            <a:effectRef idx="0">
-              <a:schemeClr val="accent1"/>
-            </a:effectRef>
-            <a:fontRef idx="minor">
-              <a:schemeClr val="lt1"/>
-            </a:fontRef>
-          </p:style>
-          <p:txBody>
-            <a:bodyPr rtlCol="0" anchor="ctr"/>
-            <a:lstStyle/>
-            <a:p>
-              <a:pPr algn="ctr"/>
-              <a:r>
-                <a:rPr lang="en-US" dirty="0" smtClean="0"/>
-                <a:t>OAServer</a:t>
-              </a:r>
-            </a:p>
-            <a:p>
-              <a:pPr algn="ctr"/>
-              <a:r>
-                <a:rPr lang="en-US" sz="1200" dirty="0" smtClean="0"/>
-                <a:t>Device: RPi / Linux Computer</a:t>
-              </a:r>
-            </a:p>
-            <a:p>
-              <a:pPr algn="ctr"/>
-              <a:r>
-                <a:rPr lang="en-US" sz="1200" dirty="0" smtClean="0"/>
-                <a:t>Language: C++</a:t>
-              </a:r>
-            </a:p>
-          </p:txBody>
-        </p:sp>
-        <p:sp>
-          <p:nvSpPr>
-            <p:cNvPr id="3" name="Can 2"/>
-            <p:cNvSpPr/>
-            <p:nvPr/>
-          </p:nvSpPr>
-          <p:spPr>
-            <a:xfrm>
-              <a:off x="4091319" y="2667000"/>
-              <a:ext cx="1491217" cy="1150531"/>
-            </a:xfrm>
-            <a:prstGeom prst="can">
-              <a:avLst/>
-            </a:prstGeom>
-          </p:spPr>
-          <p:style>
-            <a:lnRef idx="2">
-              <a:schemeClr val="accent1">
-                <a:shade val="50000"/>
-              </a:schemeClr>
-            </a:lnRef>
-            <a:fillRef idx="1">
-              <a:schemeClr val="accent1"/>
-            </a:fillRef>
-            <a:effectRef idx="0">
-              <a:schemeClr val="accent1"/>
-            </a:effectRef>
-            <a:fontRef idx="minor">
-              <a:schemeClr val="lt1"/>
-            </a:fontRef>
-          </p:style>
-          <p:txBody>
-            <a:bodyPr rtlCol="0" anchor="ctr"/>
-            <a:lstStyle/>
-            <a:p>
-              <a:pPr algn="ctr"/>
-              <a:r>
-                <a:rPr lang="en-US" dirty="0" smtClean="0"/>
-                <a:t>Database</a:t>
-              </a:r>
-            </a:p>
-            <a:p>
-              <a:pPr algn="ctr"/>
-              <a:r>
-                <a:rPr lang="en-US" dirty="0" smtClean="0"/>
-                <a:t>(sqlite)</a:t>
-              </a:r>
-              <a:endParaRPr lang="en-US" dirty="0"/>
-            </a:p>
-          </p:txBody>
-        </p:sp>
-        <p:cxnSp>
-          <p:nvCxnSpPr>
-            <p:cNvPr id="23" name="Straight Arrow Connector 22"/>
-            <p:cNvCxnSpPr>
-              <a:stCxn id="9" idx="2"/>
-            </p:cNvCxnSpPr>
-            <p:nvPr/>
-          </p:nvCxnSpPr>
-          <p:spPr>
-            <a:xfrm>
-              <a:off x="4836928" y="1879860"/>
-              <a:ext cx="886" cy="927135"/>
-            </a:xfrm>
-            <a:prstGeom prst="straightConnector1">
-              <a:avLst/>
-            </a:prstGeom>
-            <a:ln w="25400">
-              <a:solidFill>
-                <a:schemeClr val="accent2">
-                  <a:lumMod val="75000"/>
-                </a:schemeClr>
-              </a:solidFill>
-              <a:prstDash val="sysDash"/>
-              <a:headEnd type="arrow"/>
-              <a:tailEnd type="arrow"/>
-            </a:ln>
-          </p:spPr>
-          <p:style>
-            <a:lnRef idx="1">
-              <a:schemeClr val="accent1"/>
-            </a:lnRef>
-            <a:fillRef idx="0">
-              <a:schemeClr val="accent1"/>
-            </a:fillRef>
-            <a:effectRef idx="0">
-              <a:schemeClr val="accent1"/>
-            </a:effectRef>
-            <a:fontRef idx="minor">
-              <a:schemeClr val="tx1"/>
-            </a:fontRef>
-          </p:style>
-        </p:cxnSp>
       </p:grpSp>
       <p:grpSp>
         <p:nvGrpSpPr>
@@ -3750,7 +3751,11 @@
               <a:pPr algn="ctr"/>
               <a:r>
                 <a:rPr lang="en-US" sz="1200" dirty="0" smtClean="0"/>
-                <a:t>Device: Arduino</a:t>
+                <a:t>Device: </a:t>
+              </a:r>
+              <a:r>
+                <a:rPr lang="en-US" sz="1200" dirty="0" smtClean="0"/>
+                <a:t>RPi</a:t>
               </a:r>
               <a:endParaRPr lang="en-US" sz="1200" dirty="0"/>
             </a:p>
@@ -3758,7 +3763,11 @@
               <a:pPr algn="ctr"/>
               <a:r>
                 <a:rPr lang="en-US" sz="1200" dirty="0" smtClean="0"/>
-                <a:t>Language: C</a:t>
+                <a:t>Language: </a:t>
+              </a:r>
+              <a:r>
+                <a:rPr lang="en-US" sz="1200" dirty="0" smtClean="0"/>
+                <a:t>Php</a:t>
               </a:r>
               <a:endParaRPr lang="en-US" sz="1200" dirty="0"/>
             </a:p>
@@ -4043,14 +4052,13 @@
           <p:cNvPr id="17" name="Straight Arrow Connector 16"/>
           <p:cNvCxnSpPr>
             <a:stCxn id="4" idx="3"/>
-            <a:endCxn id="9" idx="1"/>
           </p:cNvCxnSpPr>
           <p:nvPr/>
         </p:nvCxnSpPr>
         <p:spPr>
           <a:xfrm flipV="1">
             <a:off x="2557131" y="1443234"/>
-            <a:ext cx="1212997" cy="746"/>
+            <a:ext cx="1136796" cy="746"/>
           </a:xfrm>
           <a:prstGeom prst="straightConnector1">
             <a:avLst/>
@@ -4084,15 +4092,14 @@
         <p:nvCxnSpPr>
           <p:cNvPr id="29" name="Straight Arrow Connector 28"/>
           <p:cNvCxnSpPr>
-            <a:stCxn id="9" idx="3"/>
             <a:endCxn id="12" idx="1"/>
           </p:cNvCxnSpPr>
           <p:nvPr/>
         </p:nvCxnSpPr>
         <p:spPr>
           <a:xfrm>
-            <a:off x="5903728" y="1443234"/>
-            <a:ext cx="1012308" cy="746"/>
+            <a:off x="5979927" y="1443980"/>
+            <a:ext cx="936109" cy="0"/>
           </a:xfrm>
           <a:prstGeom prst="straightConnector1">
             <a:avLst/>
@@ -4630,8 +4637,8 @@
           </p:nvSpPr>
           <p:spPr>
             <a:xfrm>
-              <a:off x="3770128" y="1006608"/>
-              <a:ext cx="2133600" cy="873252"/>
+              <a:off x="3693927" y="1026263"/>
+              <a:ext cx="2285999" cy="1218114"/>
             </a:xfrm>
             <a:prstGeom prst="roundRect">
               <a:avLst/>
@@ -4660,8 +4667,9 @@
               <a:pPr algn="ctr"/>
               <a:r>
                 <a:rPr lang="en-US" dirty="0" smtClean="0"/>
-                <a:t>OAServer</a:t>
-              </a:r>
+                <a:t>OAServer (REST API)</a:t>
+              </a:r>
+              <a:endParaRPr lang="en-US" dirty="0" smtClean="0"/>
             </a:p>
             <a:p>
               <a:pPr algn="ctr"/>
@@ -4674,8 +4682,13 @@
               <a:pPr algn="ctr"/>
               <a:r>
                 <a:rPr lang="en-US" sz="1200" dirty="0" smtClean="0"/>
-                <a:t>Language: C++</a:t>
-              </a:r>
+                <a:t>Language: </a:t>
+              </a:r>
+              <a:r>
+                <a:rPr lang="en-US" sz="1200" dirty="0" smtClean="0"/>
+                <a:t>Php</a:t>
+              </a:r>
+              <a:endParaRPr lang="en-US" sz="1200" dirty="0" smtClean="0"/>
             </a:p>
           </p:txBody>
         </p:sp>
@@ -4687,7 +4700,7 @@
           </p:nvSpPr>
           <p:spPr>
             <a:xfrm>
-              <a:off x="3370077" y="2682677"/>
+              <a:off x="4091318" y="2807694"/>
               <a:ext cx="1491217" cy="1150531"/>
             </a:xfrm>
             <a:prstGeom prst="can">
@@ -4724,7 +4737,7 @@
               <a:pPr algn="ctr"/>
               <a:r>
                 <a:rPr lang="en-US" dirty="0" smtClean="0"/>
-                <a:t>(sqlite)</a:t>
+                <a:t>(MySQL)</a:t>
               </a:r>
               <a:endParaRPr lang="en-US" dirty="0"/>
             </a:p>
@@ -4738,8 +4751,8 @@
           </p:nvCxnSpPr>
           <p:spPr>
             <a:xfrm>
-              <a:off x="4114800" y="1889273"/>
-              <a:ext cx="886" cy="927135"/>
+              <a:off x="4838700" y="2205633"/>
+              <a:ext cx="886" cy="735682"/>
             </a:xfrm>
             <a:prstGeom prst="straightConnector1">
               <a:avLst/>
@@ -5239,8 +5252,8 @@
         </p:nvCxnSpPr>
         <p:spPr>
           <a:xfrm>
-            <a:off x="2557131" y="1295400"/>
-            <a:ext cx="1212997" cy="147834"/>
+            <a:off x="2343213" y="1279391"/>
+            <a:ext cx="1350714" cy="355929"/>
           </a:xfrm>
           <a:prstGeom prst="straightConnector1">
             <a:avLst/>
@@ -5280,9 +5293,9 @@
           <p:nvPr/>
         </p:nvCxnSpPr>
         <p:spPr>
-          <a:xfrm>
-            <a:off x="5903728" y="1443234"/>
-            <a:ext cx="1012308" cy="746"/>
+          <a:xfrm flipV="1">
+            <a:off x="5979926" y="1443980"/>
+            <a:ext cx="936110" cy="191340"/>
           </a:xfrm>
           <a:prstGeom prst="straightConnector1">
             <a:avLst/>
@@ -5583,7 +5596,11 @@
               <a:pPr algn="ctr"/>
               <a:r>
                 <a:rPr lang="en-US" sz="1200" dirty="0" smtClean="0"/>
-                <a:t>Device: Arduino</a:t>
+                <a:t>Device: </a:t>
+              </a:r>
+              <a:r>
+                <a:rPr lang="en-US" sz="1200" dirty="0" smtClean="0"/>
+                <a:t>RPi</a:t>
               </a:r>
               <a:endParaRPr lang="en-US" sz="1200" dirty="0"/>
             </a:p>
@@ -5591,7 +5608,11 @@
               <a:pPr algn="ctr"/>
               <a:r>
                 <a:rPr lang="en-US" sz="1200" dirty="0" smtClean="0"/>
-                <a:t>Language: C</a:t>
+                <a:t>Language: </a:t>
+              </a:r>
+              <a:r>
+                <a:rPr lang="en-US" sz="1200" dirty="0" smtClean="0"/>
+                <a:t>Php</a:t>
               </a:r>
               <a:endParaRPr lang="en-US" sz="1200" dirty="0"/>
             </a:p>
@@ -5882,8 +5903,8 @@
         </p:nvCxnSpPr>
         <p:spPr>
           <a:xfrm flipV="1">
-            <a:off x="2709531" y="1443234"/>
-            <a:ext cx="1060597" cy="391633"/>
+            <a:off x="2709531" y="1635320"/>
+            <a:ext cx="984396" cy="199547"/>
           </a:xfrm>
           <a:prstGeom prst="straightConnector1">
             <a:avLst/>
@@ -6051,102 +6072,17 @@
               <a:pPr algn="ctr"/>
               <a:r>
                 <a:rPr lang="en-US" sz="1200" dirty="0" smtClean="0"/>
-                <a:t>Language: JavaScript/PHP?</a:t>
-              </a:r>
+                <a:t>Language: </a:t>
+              </a:r>
+              <a:r>
+                <a:rPr lang="en-US" sz="1200" dirty="0" smtClean="0"/>
+                <a:t>JavaScript/Php</a:t>
+              </a:r>
+              <a:endParaRPr lang="en-US" sz="1200" dirty="0" smtClean="0"/>
             </a:p>
           </p:txBody>
         </p:sp>
       </p:grpSp>
-      <p:sp>
-        <p:nvSpPr>
-          <p:cNvPr id="43" name="Rounded Rectangle 42"/>
-          <p:cNvSpPr/>
-          <p:nvPr/>
-        </p:nvSpPr>
-        <p:spPr>
-          <a:xfrm>
-            <a:off x="5181600" y="2840225"/>
-            <a:ext cx="1041990" cy="835433"/>
-          </a:xfrm>
-          <a:prstGeom prst="roundRect">
-            <a:avLst/>
-          </a:prstGeom>
-        </p:spPr>
-        <p:style>
-          <a:lnRef idx="2">
-            <a:schemeClr val="accent1">
-              <a:shade val="50000"/>
-            </a:schemeClr>
-          </a:lnRef>
-          <a:fillRef idx="1">
-            <a:schemeClr val="accent1"/>
-          </a:fillRef>
-          <a:effectRef idx="0">
-            <a:schemeClr val="accent1"/>
-          </a:effectRef>
-          <a:fontRef idx="minor">
-            <a:schemeClr val="lt1"/>
-          </a:fontRef>
-        </p:style>
-        <p:txBody>
-          <a:bodyPr rtlCol="0" anchor="ctr"/>
-          <a:lstStyle/>
-          <a:p>
-            <a:pPr algn="ctr"/>
-            <a:r>
-              <a:rPr lang="en-US" dirty="0" smtClean="0"/>
-              <a:t>Apache</a:t>
-            </a:r>
-          </a:p>
-          <a:p>
-            <a:pPr algn="ctr"/>
-            <a:r>
-              <a:rPr lang="en-US" sz="1200" dirty="0" smtClean="0"/>
-              <a:t>Web Server</a:t>
-            </a:r>
-          </a:p>
-        </p:txBody>
-      </p:sp>
-      <p:cxnSp>
-        <p:nvCxnSpPr>
-          <p:cNvPr id="44" name="Straight Arrow Connector 43"/>
-          <p:cNvCxnSpPr/>
-          <p:nvPr/>
-        </p:nvCxnSpPr>
-        <p:spPr>
-          <a:xfrm flipV="1">
-            <a:off x="5486400" y="1869499"/>
-            <a:ext cx="0" cy="970726"/>
-          </a:xfrm>
-          <a:prstGeom prst="straightConnector1">
-            <a:avLst/>
-          </a:prstGeom>
-          <a:ln w="25400">
-            <a:solidFill>
-              <a:schemeClr val="accent2">
-                <a:lumMod val="75000"/>
-              </a:schemeClr>
-            </a:solidFill>
-            <a:prstDash val="sysDash"/>
-            <a:headEnd type="arrow"/>
-            <a:tailEnd type="arrow"/>
-          </a:ln>
-        </p:spPr>
-        <p:style>
-          <a:lnRef idx="1">
-            <a:schemeClr val="accent1"/>
-          </a:lnRef>
-          <a:fillRef idx="0">
-            <a:schemeClr val="accent1"/>
-          </a:fillRef>
-          <a:effectRef idx="0">
-            <a:schemeClr val="accent1"/>
-          </a:effectRef>
-          <a:fontRef idx="minor">
-            <a:schemeClr val="tx1"/>
-          </a:fontRef>
-        </p:style>
-      </p:cxnSp>
       <p:cxnSp>
         <p:nvCxnSpPr>
           <p:cNvPr id="47" name="Straight Arrow Connector 46"/>
@@ -6154,9 +6090,9 @@
           <p:nvPr/>
         </p:nvCxnSpPr>
         <p:spPr>
-          <a:xfrm flipV="1">
-            <a:off x="6223589" y="3349954"/>
-            <a:ext cx="574661" cy="2"/>
+          <a:xfrm>
+            <a:off x="5979927" y="1635320"/>
+            <a:ext cx="818323" cy="1714634"/>
           </a:xfrm>
           <a:prstGeom prst="straightConnector1">
             <a:avLst/>
@@ -6368,7 +6304,7 @@
         </p:nvGrpSpPr>
         <p:grpSpPr>
           <a:xfrm>
-            <a:off x="3276600" y="777227"/>
+            <a:off x="3274826" y="777226"/>
             <a:ext cx="3124200" cy="3982337"/>
             <a:chOff x="3276600" y="777227"/>
             <a:chExt cx="3124200" cy="3982337"/>
@@ -6476,70 +6412,13 @@
         </p:sp>
         <p:sp>
           <p:nvSpPr>
-            <p:cNvPr id="9" name="Rounded Rectangle 8"/>
-            <p:cNvSpPr/>
-            <p:nvPr/>
-          </p:nvSpPr>
-          <p:spPr>
-            <a:xfrm>
-              <a:off x="3770128" y="1006608"/>
-              <a:ext cx="2133600" cy="873252"/>
-            </a:xfrm>
-            <a:prstGeom prst="roundRect">
-              <a:avLst/>
-            </a:prstGeom>
-          </p:spPr>
-          <p:style>
-            <a:lnRef idx="2">
-              <a:schemeClr val="accent1">
-                <a:shade val="50000"/>
-              </a:schemeClr>
-            </a:lnRef>
-            <a:fillRef idx="1">
-              <a:schemeClr val="accent1"/>
-            </a:fillRef>
-            <a:effectRef idx="0">
-              <a:schemeClr val="accent1"/>
-            </a:effectRef>
-            <a:fontRef idx="minor">
-              <a:schemeClr val="lt1"/>
-            </a:fontRef>
-          </p:style>
-          <p:txBody>
-            <a:bodyPr rtlCol="0" anchor="ctr"/>
-            <a:lstStyle/>
-            <a:p>
-              <a:pPr algn="ctr"/>
-              <a:r>
-                <a:rPr lang="en-US" dirty="0" smtClean="0"/>
-                <a:t>OAServer</a:t>
-              </a:r>
-            </a:p>
-            <a:p>
-              <a:pPr algn="ctr"/>
-              <a:r>
-                <a:rPr lang="en-US" sz="1200" dirty="0" smtClean="0"/>
-                <a:t>Device: RPi / Linux Computer</a:t>
-              </a:r>
-            </a:p>
-            <a:p>
-              <a:pPr algn="ctr"/>
-              <a:r>
-                <a:rPr lang="en-US" sz="1200" dirty="0" smtClean="0"/>
-                <a:t>Language: C++</a:t>
-              </a:r>
-            </a:p>
-          </p:txBody>
-        </p:sp>
-        <p:sp>
-          <p:nvSpPr>
             <p:cNvPr id="3" name="Can 2"/>
             <p:cNvSpPr/>
             <p:nvPr/>
           </p:nvSpPr>
           <p:spPr>
             <a:xfrm>
-              <a:off x="3370077" y="2682677"/>
+              <a:off x="4093091" y="2807694"/>
               <a:ext cx="1491217" cy="1150531"/>
             </a:xfrm>
             <a:prstGeom prst="can">
@@ -6585,13 +6464,15 @@
         <p:cxnSp>
           <p:nvCxnSpPr>
             <p:cNvPr id="23" name="Straight Arrow Connector 22"/>
-            <p:cNvCxnSpPr/>
+            <p:cNvCxnSpPr>
+              <a:stCxn id="45" idx="2"/>
+            </p:cNvCxnSpPr>
             <p:nvPr/>
           </p:nvCxnSpPr>
           <p:spPr>
             <a:xfrm>
-              <a:off x="4114800" y="1889273"/>
-              <a:ext cx="886" cy="927135"/>
+              <a:off x="4838701" y="2244378"/>
+              <a:ext cx="5030" cy="696938"/>
             </a:xfrm>
             <a:prstGeom prst="straightConnector1">
               <a:avLst/>
@@ -7084,15 +6965,13 @@
       <p:cxnSp>
         <p:nvCxnSpPr>
           <p:cNvPr id="17" name="Straight Arrow Connector 16"/>
-          <p:cNvCxnSpPr>
-            <a:endCxn id="9" idx="1"/>
-          </p:cNvCxnSpPr>
+          <p:cNvCxnSpPr/>
           <p:nvPr/>
         </p:nvCxnSpPr>
         <p:spPr>
           <a:xfrm>
             <a:off x="2557131" y="1295400"/>
-            <a:ext cx="1212997" cy="147834"/>
+            <a:ext cx="1136796" cy="244250"/>
           </a:xfrm>
           <a:prstGeom prst="straightConnector1">
             <a:avLst/>
@@ -7393,7 +7272,11 @@
               <a:pPr algn="ctr"/>
               <a:r>
                 <a:rPr lang="en-US" sz="1200" dirty="0" smtClean="0"/>
-                <a:t>Device: Arduino</a:t>
+                <a:t>Device: </a:t>
+              </a:r>
+              <a:r>
+                <a:rPr lang="en-US" sz="1200" dirty="0" smtClean="0"/>
+                <a:t>RPi</a:t>
               </a:r>
               <a:endParaRPr lang="en-US" sz="1200" dirty="0"/>
             </a:p>
@@ -7401,7 +7284,11 @@
               <a:pPr algn="ctr"/>
               <a:r>
                 <a:rPr lang="en-US" sz="1200" dirty="0" smtClean="0"/>
-                <a:t>Language: C</a:t>
+                <a:t>Language: </a:t>
+              </a:r>
+              <a:r>
+                <a:rPr lang="en-US" sz="1200" dirty="0" smtClean="0"/>
+                <a:t>Php</a:t>
               </a:r>
               <a:endParaRPr lang="en-US" sz="1200" dirty="0"/>
             </a:p>
@@ -7686,14 +7573,13 @@
           <p:cNvPr id="37" name="Straight Arrow Connector 36"/>
           <p:cNvCxnSpPr>
             <a:stCxn id="30" idx="3"/>
-            <a:endCxn id="9" idx="1"/>
           </p:cNvCxnSpPr>
           <p:nvPr/>
         </p:nvCxnSpPr>
         <p:spPr>
           <a:xfrm flipV="1">
-            <a:off x="2709531" y="1443234"/>
-            <a:ext cx="1060597" cy="391633"/>
+            <a:off x="2709531" y="1539650"/>
+            <a:ext cx="984396" cy="295217"/>
           </a:xfrm>
           <a:prstGeom prst="straightConnector1">
             <a:avLst/>
@@ -7861,22 +7747,108 @@
               <a:pPr algn="ctr"/>
               <a:r>
                 <a:rPr lang="en-US" sz="1200" dirty="0" smtClean="0"/>
-                <a:t>Language: JavaScript/PHP?</a:t>
-              </a:r>
+                <a:t>Language: </a:t>
+              </a:r>
+              <a:r>
+                <a:rPr lang="en-US" sz="1200" dirty="0" smtClean="0"/>
+                <a:t>JavaScript/Php</a:t>
+              </a:r>
+              <a:endParaRPr lang="en-US" sz="1200" dirty="0" smtClean="0"/>
             </a:p>
           </p:txBody>
         </p:sp>
       </p:grpSp>
+      <p:cxnSp>
+        <p:nvCxnSpPr>
+          <p:cNvPr id="47" name="Straight Arrow Connector 46"/>
+          <p:cNvCxnSpPr/>
+          <p:nvPr/>
+        </p:nvCxnSpPr>
+        <p:spPr>
+          <a:xfrm>
+            <a:off x="5979927" y="1635320"/>
+            <a:ext cx="818323" cy="1714634"/>
+          </a:xfrm>
+          <a:prstGeom prst="straightConnector1">
+            <a:avLst/>
+          </a:prstGeom>
+          <a:ln w="25400">
+            <a:solidFill>
+              <a:schemeClr val="accent6">
+                <a:lumMod val="75000"/>
+              </a:schemeClr>
+            </a:solidFill>
+            <a:headEnd type="arrow"/>
+            <a:tailEnd type="arrow"/>
+          </a:ln>
+        </p:spPr>
+        <p:style>
+          <a:lnRef idx="1">
+            <a:schemeClr val="accent1"/>
+          </a:lnRef>
+          <a:fillRef idx="0">
+            <a:schemeClr val="accent1"/>
+          </a:fillRef>
+          <a:effectRef idx="0">
+            <a:schemeClr val="accent1"/>
+          </a:effectRef>
+          <a:fontRef idx="minor">
+            <a:schemeClr val="tx1"/>
+          </a:fontRef>
+        </p:style>
+      </p:cxnSp>
+      <p:cxnSp>
+        <p:nvCxnSpPr>
+          <p:cNvPr id="29" name="Straight Arrow Connector 28"/>
+          <p:cNvCxnSpPr>
+            <a:stCxn id="45" idx="3"/>
+            <a:endCxn id="12" idx="1"/>
+          </p:cNvCxnSpPr>
+          <p:nvPr/>
+        </p:nvCxnSpPr>
+        <p:spPr>
+          <a:xfrm flipV="1">
+            <a:off x="5979926" y="1443980"/>
+            <a:ext cx="936110" cy="191340"/>
+          </a:xfrm>
+          <a:prstGeom prst="straightConnector1">
+            <a:avLst/>
+          </a:prstGeom>
+          <a:ln w="25400">
+            <a:solidFill>
+              <a:schemeClr val="accent6">
+                <a:lumMod val="75000"/>
+              </a:schemeClr>
+            </a:solidFill>
+            <a:headEnd type="arrow"/>
+            <a:tailEnd type="arrow"/>
+          </a:ln>
+        </p:spPr>
+        <p:style>
+          <a:lnRef idx="1">
+            <a:schemeClr val="accent1"/>
+          </a:lnRef>
+          <a:fillRef idx="0">
+            <a:schemeClr val="accent1"/>
+          </a:fillRef>
+          <a:effectRef idx="0">
+            <a:schemeClr val="accent1"/>
+          </a:effectRef>
+          <a:fontRef idx="minor">
+            <a:schemeClr val="tx1"/>
+          </a:fontRef>
+        </p:style>
+      </p:cxnSp>
       <p:sp>
         <p:nvSpPr>
-          <p:cNvPr id="43" name="Rounded Rectangle 42"/>
+          <p:cNvPr id="45" name="Rounded Rectangle 44"/>
           <p:cNvSpPr/>
           <p:nvPr/>
         </p:nvSpPr>
         <p:spPr>
           <a:xfrm>
-            <a:off x="5181600" y="2840225"/>
-            <a:ext cx="1041990" cy="835433"/>
+            <a:off x="3693927" y="1026263"/>
+            <a:ext cx="2285999" cy="1218114"/>
           </a:xfrm>
           <a:prstGeom prst="roundRect">
             <a:avLst/>
@@ -7905,139 +7877,31 @@
             <a:pPr algn="ctr"/>
             <a:r>
               <a:rPr lang="en-US" dirty="0" smtClean="0"/>
-              <a:t>Apache</a:t>
+              <a:t>OAServer (REST API)</a:t>
             </a:r>
+            <a:endParaRPr lang="en-US" dirty="0" smtClean="0"/>
           </a:p>
           <a:p>
             <a:pPr algn="ctr"/>
             <a:r>
               <a:rPr lang="en-US" sz="1200" dirty="0" smtClean="0"/>
-              <a:t>Web Server</a:t>
+              <a:t>Device: RPi / Linux Computer</a:t>
             </a:r>
+          </a:p>
+          <a:p>
+            <a:pPr algn="ctr"/>
+            <a:r>
+              <a:rPr lang="en-US" sz="1200" dirty="0" smtClean="0"/>
+              <a:t>Language: </a:t>
+            </a:r>
+            <a:r>
+              <a:rPr lang="en-US" sz="1200" dirty="0" smtClean="0"/>
+              <a:t>Php</a:t>
+            </a:r>
+            <a:endParaRPr lang="en-US" sz="1200" dirty="0" smtClean="0"/>
           </a:p>
         </p:txBody>
       </p:sp>
-      <p:cxnSp>
-        <p:nvCxnSpPr>
-          <p:cNvPr id="44" name="Straight Arrow Connector 43"/>
-          <p:cNvCxnSpPr/>
-          <p:nvPr/>
-        </p:nvCxnSpPr>
-        <p:spPr>
-          <a:xfrm flipV="1">
-            <a:off x="5486400" y="1869499"/>
-            <a:ext cx="0" cy="970726"/>
-          </a:xfrm>
-          <a:prstGeom prst="straightConnector1">
-            <a:avLst/>
-          </a:prstGeom>
-          <a:ln w="25400">
-            <a:solidFill>
-              <a:schemeClr val="accent2">
-                <a:lumMod val="75000"/>
-              </a:schemeClr>
-            </a:solidFill>
-            <a:prstDash val="sysDash"/>
-            <a:headEnd type="arrow"/>
-            <a:tailEnd type="arrow"/>
-          </a:ln>
-        </p:spPr>
-        <p:style>
-          <a:lnRef idx="1">
-            <a:schemeClr val="accent1"/>
-          </a:lnRef>
-          <a:fillRef idx="0">
-            <a:schemeClr val="accent1"/>
-          </a:fillRef>
-          <a:effectRef idx="0">
-            <a:schemeClr val="accent1"/>
-          </a:effectRef>
-          <a:fontRef idx="minor">
-            <a:schemeClr val="tx1"/>
-          </a:fontRef>
-        </p:style>
-      </p:cxnSp>
-      <p:cxnSp>
-        <p:nvCxnSpPr>
-          <p:cNvPr id="47" name="Straight Arrow Connector 46"/>
-          <p:cNvCxnSpPr/>
-          <p:nvPr/>
-        </p:nvCxnSpPr>
-        <p:spPr>
-          <a:xfrm flipV="1">
-            <a:off x="6223589" y="3349954"/>
-            <a:ext cx="574661" cy="2"/>
-          </a:xfrm>
-          <a:prstGeom prst="straightConnector1">
-            <a:avLst/>
-          </a:prstGeom>
-          <a:ln w="25400">
-            <a:solidFill>
-              <a:schemeClr val="accent6">
-                <a:lumMod val="75000"/>
-              </a:schemeClr>
-            </a:solidFill>
-            <a:headEnd type="arrow"/>
-            <a:tailEnd type="arrow"/>
-          </a:ln>
-        </p:spPr>
-        <p:style>
-          <a:lnRef idx="1">
-            <a:schemeClr val="accent1"/>
-          </a:lnRef>
-          <a:fillRef idx="0">
-            <a:schemeClr val="accent1"/>
-          </a:fillRef>
-          <a:effectRef idx="0">
-            <a:schemeClr val="accent1"/>
-          </a:effectRef>
-          <a:fontRef idx="minor">
-            <a:schemeClr val="tx1"/>
-          </a:fontRef>
-        </p:style>
-      </p:cxnSp>
-      <p:cxnSp>
-        <p:nvCxnSpPr>
-          <p:cNvPr id="29" name="Straight Arrow Connector 28"/>
-          <p:cNvCxnSpPr>
-            <a:stCxn id="43" idx="3"/>
-            <a:endCxn id="12" idx="1"/>
-          </p:cNvCxnSpPr>
-          <p:nvPr/>
-        </p:nvCxnSpPr>
-        <p:spPr>
-          <a:xfrm flipV="1">
-            <a:off x="6223590" y="1443980"/>
-            <a:ext cx="692446" cy="1813962"/>
-          </a:xfrm>
-          <a:prstGeom prst="straightConnector1">
-            <a:avLst/>
-          </a:prstGeom>
-          <a:ln w="25400">
-            <a:solidFill>
-              <a:schemeClr val="accent6">
-                <a:lumMod val="75000"/>
-              </a:schemeClr>
-            </a:solidFill>
-            <a:headEnd type="arrow"/>
-            <a:tailEnd type="arrow"/>
-          </a:ln>
-        </p:spPr>
-        <p:style>
-          <a:lnRef idx="1">
-            <a:schemeClr val="accent1"/>
-          </a:lnRef>
-          <a:fillRef idx="0">
-            <a:schemeClr val="accent1"/>
-          </a:fillRef>
-          <a:effectRef idx="0">
-            <a:schemeClr val="accent1"/>
-          </a:effectRef>
-          <a:fontRef idx="minor">
-            <a:schemeClr val="tx1"/>
-          </a:fontRef>
-        </p:style>
-      </p:cxnSp>
     </p:spTree>
     <p:extLst>
       <p:ext uri="{BB962C8B-B14F-4D97-AF65-F5344CB8AC3E}">

</xml_diff>